<commit_message>
modif readme + tuto
</commit_message>
<xml_diff>
--- a/Tutorial.pptx
+++ b/Tutorial.pptx
@@ -2500,21 +2500,21 @@
             </a:r>
           </a:p>
           <a:p>
+            <a:r>
+              <a:rPr lang="en-US" dirty="0"/>
+              <a:t>Unzip the Tools.zip in</a:t>
+            </a:r>
+          </a:p>
+          <a:p>
             <a:pPr lvl="1"/>
             <a:r>
               <a:rPr lang="en-US" dirty="0"/>
-              <a:t>C:\Graphics\Tools</a:t>
-            </a:r>
-          </a:p>
-          <a:p>
-            <a:pPr lvl="2"/>
-            <a:r>
-              <a:rPr lang="en-US" dirty="0"/>
-              <a:t>If you don’t follow my instruction, I will take points off. </a:t>
-            </a:r>
-          </a:p>
-          <a:p>
-            <a:pPr lvl="1"/>
+              <a:t>C:\Graphics</a:t>
+            </a:r>
+            <a:r>
+              <a:rPr lang="en-US"/>
+              <a:t>\Tools</a:t>
+            </a:r>
             <a:endParaRPr lang="en-US" dirty="0"/>
           </a:p>
         </p:txBody>

</xml_diff>